<commit_message>
[ex1] changed all links in pdf to fit new locations
</commit_message>
<xml_diff>
--- a/ex1/ex1_results.pptx
+++ b/ex1/ex1_results.pptx
@@ -126,7 +126,7 @@
   </p:defaultTextStyle>
   <p:extLst>
     <p:ext uri="{EFAFB233-063F-42B5-8137-9DF3F51BA10A}">
-      <p15:sldGuideLst xmlns="" xmlns:p15="http://schemas.microsoft.com/office/powerpoint/2012/main"/>
+      <p15:sldGuideLst xmlns:p15="http://schemas.microsoft.com/office/powerpoint/2012/main" xmlns=""/>
     </p:ext>
   </p:extLst>
 </p:presentation>
@@ -5407,8 +5407,8 @@
         </p:nvSpPr>
         <p:spPr>
           <a:xfrm>
-            <a:off x="1883846" y="4320000"/>
-            <a:ext cx="5376308" cy="276999"/>
+            <a:off x="1437224" y="4320000"/>
+            <a:ext cx="6269552" cy="276999"/>
           </a:xfrm>
           <a:prstGeom prst="rect">
             <a:avLst/>
@@ -5435,6 +5435,18 @@
                 <a:hlinkClick r:id="rId4" action="ppaction://hlinkfile"/>
               </a:rPr>
               <a:t>../</a:t>
+            </a:r>
+            <a:r>
+              <a:rPr lang="de-DE" sz="1200" dirty="0" err="1" smtClean="0">
+                <a:hlinkClick r:id="rId4" action="ppaction://hlinkfile"/>
+              </a:rPr>
+              <a:t>attachment</a:t>
+            </a:r>
+            <a:r>
+              <a:rPr lang="de-DE" sz="1200" dirty="0" smtClean="0">
+                <a:hlinkClick r:id="rId4" action="ppaction://hlinkfile"/>
+              </a:rPr>
+              <a:t>/</a:t>
             </a:r>
             <a:r>
               <a:rPr lang="de-DE" sz="1200" dirty="0" err="1" smtClean="0">
@@ -5880,28 +5892,16 @@
           <a:p>
             <a:r>
               <a:rPr lang="de-DE" dirty="0" smtClean="0"/>
-              <a:t>Für diesen Teil der Aufgabe haben wir unseren Programm-Code aus Aufgabe 2 zusätzlich </a:t>
-            </a:r>
+              <a:t>Für diesen Teil der Aufgabe haben wir unseren Programm-Code aus Aufgabe 2 zusätzlich erweitert um uns auch eine Liste der Anzahl der Worte, die mit einer bestimmten Häufigkeit vorkommen, ausgeben zu lassen.</a:t>
+            </a:r>
+          </a:p>
+          <a:p>
+            <a:endParaRPr lang="de-DE" dirty="0"/>
+          </a:p>
+          <a:p>
             <a:r>
               <a:rPr lang="de-DE" dirty="0" smtClean="0"/>
-              <a:t>erweitert um </a:t>
-            </a:r>
-            <a:r>
-              <a:rPr lang="de-DE" dirty="0" smtClean="0"/>
-              <a:t>uns auch eine Liste der Anzahl der Worte, die mit einer bestimmten Häufigkeit vorkommen, ausgeben zu lassen.</a:t>
-            </a:r>
-          </a:p>
-          <a:p>
-            <a:endParaRPr lang="de-DE" dirty="0"/>
-          </a:p>
-          <a:p>
-            <a:r>
-              <a:rPr lang="de-DE" dirty="0" smtClean="0"/>
-              <a:t>Die untersuchten Texte bleiben die selben, auch hier wurden </a:t>
-            </a:r>
-            <a:r>
-              <a:rPr lang="de-DE" dirty="0" smtClean="0"/>
-              <a:t>Stopp-Wörter nicht herausgefiltert und dementsprechend mitberücksichtigt.</a:t>
+              <a:t>Die untersuchten Texte bleiben die selben, auch hier wurden Stopp-Wörter nicht herausgefiltert und dementsprechend mitberücksichtigt.</a:t>
             </a:r>
           </a:p>
           <a:p>
@@ -5932,7 +5932,7 @@
               <a:rPr lang="de-DE" sz="1400" dirty="0" err="1" smtClean="0">
                 <a:hlinkClick r:id="rId4" action="ppaction://hlinkfile"/>
               </a:rPr>
-              <a:t>results</a:t>
+              <a:t>attachment</a:t>
             </a:r>
             <a:r>
               <a:rPr lang="de-DE" sz="1400" dirty="0" smtClean="0">
@@ -5944,13 +5944,7 @@
               <a:rPr lang="de-DE" sz="1400" dirty="0" err="1" smtClean="0">
                 <a:hlinkClick r:id="rId4" action="ppaction://hlinkfile"/>
               </a:rPr>
-              <a:t>word</a:t>
-            </a:r>
-            <a:r>
-              <a:rPr lang="de-DE" sz="1400" dirty="0" err="1" smtClean="0">
-                <a:hlinkClick r:id="rId4" action="ppaction://hlinkfile"/>
-              </a:rPr>
-              <a:t>_with_stopwords</a:t>
+              <a:t>results</a:t>
             </a:r>
             <a:r>
               <a:rPr lang="de-DE" sz="1400" dirty="0" smtClean="0">
@@ -5962,6 +5956,18 @@
               <a:rPr lang="de-DE" sz="1400" dirty="0" err="1" smtClean="0">
                 <a:hlinkClick r:id="rId4" action="ppaction://hlinkfile"/>
               </a:rPr>
+              <a:t>word_with_stopwords</a:t>
+            </a:r>
+            <a:r>
+              <a:rPr lang="de-DE" sz="1400" dirty="0" smtClean="0">
+                <a:hlinkClick r:id="rId4" action="ppaction://hlinkfile"/>
+              </a:rPr>
+              <a:t>/</a:t>
+            </a:r>
+            <a:r>
+              <a:rPr lang="de-DE" sz="1400" dirty="0" err="1" smtClean="0">
+                <a:hlinkClick r:id="rId4" action="ppaction://hlinkfile"/>
+              </a:rPr>
               <a:t>geschw_OCC</a:t>
             </a:r>
             <a:endParaRPr lang="de-DE" sz="1400" dirty="0" smtClean="0"/>
@@ -5976,10 +5982,22 @@
               <a:t>	Jedermann:	</a:t>
             </a:r>
             <a:r>
-              <a:rPr lang="de-DE" sz="1400" dirty="0">
+              <a:rPr lang="de-DE" sz="1400" dirty="0" smtClean="0">
                 <a:hlinkClick r:id="rId5" action="ppaction://hlinkfile"/>
               </a:rPr>
               <a:t>../</a:t>
+            </a:r>
+            <a:r>
+              <a:rPr lang="de-DE" sz="1400" dirty="0" err="1" smtClean="0">
+                <a:hlinkClick r:id="rId5" action="ppaction://hlinkfile"/>
+              </a:rPr>
+              <a:t>attachment</a:t>
+            </a:r>
+            <a:r>
+              <a:rPr lang="de-DE" sz="1400" dirty="0" smtClean="0">
+                <a:hlinkClick r:id="rId5" action="ppaction://hlinkfile"/>
+              </a:rPr>
+              <a:t>/</a:t>
             </a:r>
             <a:r>
               <a:rPr lang="de-DE" sz="1400" dirty="0" err="1" smtClean="0">
@@ -6043,10 +6061,22 @@
               <a:t>	</a:t>
             </a:r>
             <a:r>
-              <a:rPr lang="de-DE" sz="1400" dirty="0">
+              <a:rPr lang="de-DE" sz="1400" dirty="0" smtClean="0">
                 <a:hlinkClick r:id="rId6" action="ppaction://hlinkfile"/>
               </a:rPr>
               <a:t>../</a:t>
+            </a:r>
+            <a:r>
+              <a:rPr lang="de-DE" sz="1400" dirty="0" err="1" smtClean="0">
+                <a:hlinkClick r:id="rId6" action="ppaction://hlinkfile"/>
+              </a:rPr>
+              <a:t>attachment</a:t>
+            </a:r>
+            <a:r>
+              <a:rPr lang="de-DE" sz="1400" dirty="0" smtClean="0">
+                <a:hlinkClick r:id="rId6" action="ppaction://hlinkfile"/>
+              </a:rPr>
+              <a:t>/</a:t>
             </a:r>
             <a:r>
               <a:rPr lang="de-DE" sz="1400" dirty="0" err="1" smtClean="0">
@@ -6098,10 +6128,22 @@
               <a:t>:		</a:t>
             </a:r>
             <a:r>
-              <a:rPr lang="de-DE" sz="1400" dirty="0">
+              <a:rPr lang="de-DE" sz="1400" dirty="0" smtClean="0">
                 <a:hlinkClick r:id="rId7" action="ppaction://hlinkfile"/>
               </a:rPr>
               <a:t>../</a:t>
+            </a:r>
+            <a:r>
+              <a:rPr lang="de-DE" sz="1400" dirty="0" err="1" smtClean="0">
+                <a:hlinkClick r:id="rId7" action="ppaction://hlinkfile"/>
+              </a:rPr>
+              <a:t>attachment</a:t>
+            </a:r>
+            <a:r>
+              <a:rPr lang="de-DE" sz="1400" dirty="0" smtClean="0">
+                <a:hlinkClick r:id="rId7" action="ppaction://hlinkfile"/>
+              </a:rPr>
+              <a:t>/</a:t>
             </a:r>
             <a:r>
               <a:rPr lang="de-DE" sz="1400" dirty="0" err="1" smtClean="0">
@@ -6546,15 +6588,7 @@
           <a:p>
             <a:r>
               <a:rPr lang="de-DE" dirty="0" smtClean="0"/>
-              <a:t>Hier zeigen sich ähnliche Ergebnisse wie in der vorherigen Teilaufgabe. Man erkennt, dass Wörter die mit einer niedrigen Häufigkeit </a:t>
-            </a:r>
-            <a:r>
-              <a:rPr lang="de-DE" dirty="0" smtClean="0"/>
-              <a:t>auftreten, </a:t>
-            </a:r>
-            <a:r>
-              <a:rPr lang="de-DE" dirty="0" smtClean="0"/>
-              <a:t>trotzdem einen großen Anteil an der Gesamtanzahl der Wörter ausmachen. </a:t>
+              <a:t>Hier zeigen sich ähnliche Ergebnisse wie in der vorherigen Teilaufgabe. Man erkennt, dass Wörter die mit einer niedrigen Häufigkeit auftreten, trotzdem einen großen Anteil an der Gesamtanzahl der Wörter ausmachen. </a:t>
             </a:r>
             <a:r>
               <a:rPr lang="de-DE" dirty="0"/>
@@ -6584,8 +6618,8 @@
         </p:nvSpPr>
         <p:spPr>
           <a:xfrm>
-            <a:off x="2237830" y="4320000"/>
-            <a:ext cx="4668340" cy="276999"/>
+            <a:off x="1765150" y="4320000"/>
+            <a:ext cx="5613701" cy="276999"/>
           </a:xfrm>
           <a:prstGeom prst="rect">
             <a:avLst/>
@@ -6612,6 +6646,18 @@
                 <a:hlinkClick r:id="rId4" action="ppaction://hlinkfile"/>
               </a:rPr>
               <a:t>../</a:t>
+            </a:r>
+            <a:r>
+              <a:rPr lang="de-DE" sz="1200" dirty="0" err="1" smtClean="0">
+                <a:hlinkClick r:id="rId4" action="ppaction://hlinkfile"/>
+              </a:rPr>
+              <a:t>attachment</a:t>
+            </a:r>
+            <a:r>
+              <a:rPr lang="de-DE" sz="1200" dirty="0" smtClean="0">
+                <a:hlinkClick r:id="rId4" action="ppaction://hlinkfile"/>
+              </a:rPr>
+              <a:t>/</a:t>
             </a:r>
             <a:r>
               <a:rPr lang="de-DE" sz="1200" dirty="0" err="1" smtClean="0">
@@ -7107,8 +7153,8 @@
         </p:nvSpPr>
         <p:spPr>
           <a:xfrm>
-            <a:off x="1716792" y="4320000"/>
-            <a:ext cx="5710416" cy="276999"/>
+            <a:off x="1353697" y="4320000"/>
+            <a:ext cx="6436606" cy="276999"/>
           </a:xfrm>
           <a:prstGeom prst="rect">
             <a:avLst/>
@@ -7135,6 +7181,18 @@
                 <a:hlinkClick r:id="rId4" action="ppaction://hlinkfile"/>
               </a:rPr>
               <a:t>../</a:t>
+            </a:r>
+            <a:r>
+              <a:rPr lang="de-DE" sz="1200" dirty="0" err="1" smtClean="0">
+                <a:hlinkClick r:id="rId4" action="ppaction://hlinkfile"/>
+              </a:rPr>
+              <a:t>attachment</a:t>
+            </a:r>
+            <a:r>
+              <a:rPr lang="de-DE" sz="1200" dirty="0" smtClean="0">
+                <a:hlinkClick r:id="rId4" action="ppaction://hlinkfile"/>
+              </a:rPr>
+              <a:t>/</a:t>
             </a:r>
             <a:r>
               <a:rPr lang="de-DE" sz="1200" dirty="0" err="1" smtClean="0">
@@ -7589,11 +7647,7 @@
           <a:p>
             <a:r>
               <a:rPr lang="de-DE" dirty="0" smtClean="0"/>
-              <a:t>Die untersuchten Texte bleiben die selben, auch hier wurden Stopp-Wörter mit berücksichtigt und nicht herausgefiltert</a:t>
-            </a:r>
-            <a:r>
-              <a:rPr lang="de-DE" dirty="0" smtClean="0"/>
-              <a:t>.</a:t>
+              <a:t>Die untersuchten Texte bleiben die selben, auch hier wurden Stopp-Wörter mit berücksichtigt und nicht herausgefiltert.</a:t>
             </a:r>
           </a:p>
           <a:p>
@@ -7624,7 +7678,7 @@
               <a:rPr lang="de-DE" sz="1400" dirty="0" err="1" smtClean="0">
                 <a:hlinkClick r:id="rId4" action="ppaction://hlinkfile"/>
               </a:rPr>
-              <a:t>results</a:t>
+              <a:t>attachment</a:t>
             </a:r>
             <a:r>
               <a:rPr lang="de-DE" sz="1400" dirty="0" smtClean="0">
@@ -7636,7 +7690,7 @@
               <a:rPr lang="de-DE" sz="1400" dirty="0" err="1" smtClean="0">
                 <a:hlinkClick r:id="rId4" action="ppaction://hlinkfile"/>
               </a:rPr>
-              <a:t>char</a:t>
+              <a:t>results</a:t>
             </a:r>
             <a:r>
               <a:rPr lang="de-DE" sz="1400" dirty="0" smtClean="0">
@@ -7644,6 +7698,18 @@
               </a:rPr>
               <a:t>/</a:t>
             </a:r>
+            <a:r>
+              <a:rPr lang="de-DE" sz="1400" dirty="0" err="1" smtClean="0">
+                <a:hlinkClick r:id="rId4" action="ppaction://hlinkfile"/>
+              </a:rPr>
+              <a:t>char</a:t>
+            </a:r>
+            <a:r>
+              <a:rPr lang="de-DE" sz="1400" dirty="0" smtClean="0">
+                <a:hlinkClick r:id="rId4" action="ppaction://hlinkfile"/>
+              </a:rPr>
+              <a:t>/</a:t>
+            </a:r>
             <a:endParaRPr lang="de-DE" sz="1400" dirty="0" smtClean="0"/>
           </a:p>
           <a:p>
@@ -7660,6 +7726,18 @@
                 <a:hlinkClick r:id="rId5" action="ppaction://hlinkfile"/>
               </a:rPr>
               <a:t>../</a:t>
+            </a:r>
+            <a:r>
+              <a:rPr lang="de-DE" sz="1400" dirty="0" err="1" smtClean="0">
+                <a:hlinkClick r:id="rId5" action="ppaction://hlinkfile"/>
+              </a:rPr>
+              <a:t>attachment</a:t>
+            </a:r>
+            <a:r>
+              <a:rPr lang="de-DE" sz="1400" dirty="0" smtClean="0">
+                <a:hlinkClick r:id="rId5" action="ppaction://hlinkfile"/>
+              </a:rPr>
+              <a:t>/</a:t>
             </a:r>
             <a:r>
               <a:rPr lang="de-DE" sz="1400" dirty="0" err="1" smtClean="0">
@@ -8135,6 +8213,18 @@
                 <a:hlinkClick r:id="rId4" action="ppaction://hlinkfile"/>
               </a:rPr>
               <a:t>../</a:t>
+            </a:r>
+            <a:r>
+              <a:rPr lang="de-DE" sz="1200" dirty="0" err="1" smtClean="0">
+                <a:hlinkClick r:id="rId4" action="ppaction://hlinkfile"/>
+              </a:rPr>
+              <a:t>attachment</a:t>
+            </a:r>
+            <a:r>
+              <a:rPr lang="de-DE" sz="1200" dirty="0" smtClean="0">
+                <a:hlinkClick r:id="rId4" action="ppaction://hlinkfile"/>
+              </a:rPr>
+              <a:t>/</a:t>
             </a:r>
             <a:r>
               <a:rPr lang="de-DE" sz="1200" dirty="0" err="1" smtClean="0">
@@ -9875,31 +9965,7 @@
           <a:p>
             <a:r>
               <a:rPr lang="de-DE" dirty="0" smtClean="0"/>
-              <a:t>In dieser Abbildung wird die relative Häufigkeit bestimmter Buchstaben-Paare in den einzelnen Texten verglichen. Auffällig ist, </a:t>
-            </a:r>
-            <a:r>
-              <a:rPr lang="de-DE" dirty="0" smtClean="0"/>
-              <a:t>dass, </a:t>
-            </a:r>
-            <a:r>
-              <a:rPr lang="de-DE" dirty="0" smtClean="0"/>
-              <a:t>besonders in den Bereichen zwischen Rang 1 und </a:t>
-            </a:r>
-            <a:r>
-              <a:rPr lang="de-DE" dirty="0" smtClean="0"/>
-              <a:t>10, </a:t>
-            </a:r>
-            <a:r>
-              <a:rPr lang="de-DE" dirty="0" smtClean="0"/>
-              <a:t>die deutschen Texte relativ nah beieinander </a:t>
-            </a:r>
-            <a:r>
-              <a:rPr lang="de-DE" dirty="0" smtClean="0"/>
-              <a:t>liegen, </a:t>
-            </a:r>
-            <a:r>
-              <a:rPr lang="de-DE" dirty="0" smtClean="0"/>
-              <a:t>während die englischen Texte besonders in den niedrigeren Rängen größere Varianzen aufweisen.</a:t>
+              <a:t>In dieser Abbildung wird die relative Häufigkeit bestimmter Buchstaben-Paare in den einzelnen Texten verglichen. Auffällig ist, dass, besonders in den Bereichen zwischen Rang 1 und 10, die deutschen Texte relativ nah beieinander liegen, während die englischen Texte besonders in den niedrigeren Rängen größere Varianzen aufweisen.</a:t>
             </a:r>
             <a:endParaRPr lang="de-DE" i="1" dirty="0" smtClean="0"/>
           </a:p>
@@ -9941,6 +10007,18 @@
                 <a:hlinkClick r:id="rId4" action="ppaction://hlinkfile"/>
               </a:rPr>
               <a:t>../</a:t>
+            </a:r>
+            <a:r>
+              <a:rPr lang="de-DE" sz="1200" dirty="0" err="1" smtClean="0">
+                <a:hlinkClick r:id="rId4" action="ppaction://hlinkfile"/>
+              </a:rPr>
+              <a:t>attachment</a:t>
+            </a:r>
+            <a:r>
+              <a:rPr lang="de-DE" sz="1200" dirty="0" smtClean="0">
+                <a:hlinkClick r:id="rId4" action="ppaction://hlinkfile"/>
+              </a:rPr>
+              <a:t>/</a:t>
             </a:r>
             <a:r>
               <a:rPr lang="de-DE" sz="1200" dirty="0" err="1" smtClean="0">
@@ -12126,7 +12204,7 @@
           <a:graphicData uri="http://schemas.openxmlformats.org/presentationml/2006/ole">
             <mc:AlternateContent xmlns:mc="http://schemas.openxmlformats.org/markup-compatibility/2006">
               <mc:Choice xmlns:v="urn:schemas-microsoft-com:vml" Requires="v">
-                <p:oleObj spid="_x0000_s5176" name="Visio" r:id="rId5" imgW="6295988" imgH="1619190" progId="Visio.Drawing.15">
+                <p:oleObj spid="_x0000_s5180" name="Visio" r:id="rId5" imgW="6295988" imgH="1619190" progId="Visio.Drawing.15">
                   <p:embed/>
                 </p:oleObj>
               </mc:Choice>
@@ -12545,7 +12623,6 @@
               <a:rPr lang="de-DE" dirty="0" smtClean="0"/>
               <a:t>)</a:t>
             </a:r>
-            <a:endParaRPr lang="de-DE" dirty="0" smtClean="0"/>
           </a:p>
           <a:p>
             <a:endParaRPr lang="de-DE" dirty="0"/>
@@ -13081,11 +13158,7 @@
             </a:r>
             <a:r>
               <a:rPr lang="de-DE" dirty="0" smtClean="0"/>
-              <a:t> – Hugo von </a:t>
-            </a:r>
-            <a:r>
-              <a:rPr lang="de-DE" dirty="0" smtClean="0"/>
-              <a:t>Hofmannsthal</a:t>
+              <a:t> – Hugo von Hofmannsthal</a:t>
             </a:r>
           </a:p>
           <a:p>
@@ -13169,7 +13242,7 @@
               <a:rPr lang="de-DE" sz="1400" dirty="0" err="1" smtClean="0">
                 <a:hlinkClick r:id="rId6" action="ppaction://hlinkfile"/>
               </a:rPr>
-              <a:t>results</a:t>
+              <a:t>attachment</a:t>
             </a:r>
             <a:r>
               <a:rPr lang="de-DE" sz="1400" dirty="0" smtClean="0">
@@ -13181,7 +13254,7 @@
               <a:rPr lang="de-DE" sz="1400" dirty="0" err="1" smtClean="0">
                 <a:hlinkClick r:id="rId6" action="ppaction://hlinkfile"/>
               </a:rPr>
-              <a:t>word_with_stopwords</a:t>
+              <a:t>results</a:t>
             </a:r>
             <a:r>
               <a:rPr lang="de-DE" sz="1400" dirty="0" smtClean="0">
@@ -13193,6 +13266,18 @@
               <a:rPr lang="de-DE" sz="1400" dirty="0" err="1" smtClean="0">
                 <a:hlinkClick r:id="rId6" action="ppaction://hlinkfile"/>
               </a:rPr>
+              <a:t>word_with_stopwords</a:t>
+            </a:r>
+            <a:r>
+              <a:rPr lang="de-DE" sz="1400" dirty="0" smtClean="0">
+                <a:hlinkClick r:id="rId6" action="ppaction://hlinkfile"/>
+              </a:rPr>
+              <a:t>/</a:t>
+            </a:r>
+            <a:r>
+              <a:rPr lang="de-DE" sz="1400" dirty="0" err="1" smtClean="0">
+                <a:hlinkClick r:id="rId6" action="ppaction://hlinkfile"/>
+              </a:rPr>
               <a:t>geschw</a:t>
             </a:r>
             <a:endParaRPr lang="de-DE" sz="1400" dirty="0" smtClean="0"/>
@@ -13212,6 +13297,18 @@
                 <a:hlinkClick r:id="rId7" action="ppaction://hlinkfile"/>
               </a:rPr>
               <a:t>../</a:t>
+            </a:r>
+            <a:r>
+              <a:rPr lang="de-DE" sz="1400" dirty="0" err="1" smtClean="0">
+                <a:hlinkClick r:id="rId7" action="ppaction://hlinkfile"/>
+              </a:rPr>
+              <a:t>attachment</a:t>
+            </a:r>
+            <a:r>
+              <a:rPr lang="de-DE" sz="1400" dirty="0" smtClean="0">
+                <a:hlinkClick r:id="rId7" action="ppaction://hlinkfile"/>
+              </a:rPr>
+              <a:t>/</a:t>
             </a:r>
             <a:r>
               <a:rPr lang="de-DE" sz="1400" dirty="0" err="1" smtClean="0">
@@ -13257,7 +13354,7 @@
         </p:nvGraphicFramePr>
         <p:xfrm>
           <a:off x="5972350" y="1505875"/>
-          <a:ext cx="3001583" cy="4376997"/>
+          <a:ext cx="3001583" cy="4571307"/>
         </p:xfrm>
         <a:graphic>
           <a:graphicData uri="http://schemas.openxmlformats.org/drawingml/2006/table">
@@ -15843,10 +15940,22 @@
               <a:t>Ergebnisse: </a:t>
             </a:r>
             <a:r>
-              <a:rPr lang="de-DE" sz="1400" dirty="0">
+              <a:rPr lang="de-DE" sz="1400" dirty="0" smtClean="0">
                 <a:hlinkClick r:id="rId5" action="ppaction://hlinkfile"/>
               </a:rPr>
               <a:t>../</a:t>
+            </a:r>
+            <a:r>
+              <a:rPr lang="de-DE" sz="1400" dirty="0" err="1" smtClean="0">
+                <a:hlinkClick r:id="rId5" action="ppaction://hlinkfile"/>
+              </a:rPr>
+              <a:t>attachment</a:t>
+            </a:r>
+            <a:r>
+              <a:rPr lang="de-DE" sz="1400" dirty="0" smtClean="0">
+                <a:hlinkClick r:id="rId5" action="ppaction://hlinkfile"/>
+              </a:rPr>
+              <a:t>/</a:t>
             </a:r>
             <a:r>
               <a:rPr lang="de-DE" sz="1400" dirty="0" err="1" smtClean="0">
@@ -15887,10 +15996,22 @@
               <a:t>                     </a:t>
             </a:r>
             <a:r>
-              <a:rPr lang="de-DE" sz="1400" dirty="0">
+              <a:rPr lang="de-DE" sz="1400" dirty="0" smtClean="0">
                 <a:hlinkClick r:id="rId6" action="ppaction://hlinkfile"/>
               </a:rPr>
               <a:t>../</a:t>
+            </a:r>
+            <a:r>
+              <a:rPr lang="de-DE" sz="1400" dirty="0" err="1" smtClean="0">
+                <a:hlinkClick r:id="rId6" action="ppaction://hlinkfile"/>
+              </a:rPr>
+              <a:t>attachment</a:t>
+            </a:r>
+            <a:r>
+              <a:rPr lang="de-DE" sz="1400" dirty="0" smtClean="0">
+                <a:hlinkClick r:id="rId6" action="ppaction://hlinkfile"/>
+              </a:rPr>
+              <a:t>/</a:t>
             </a:r>
             <a:r>
               <a:rPr lang="de-DE" sz="1400" dirty="0" err="1" smtClean="0">
@@ -15926,13 +16047,8 @@
             <a:pPr lvl="0"/>
             <a:r>
               <a:rPr lang="de-DE" dirty="0" smtClean="0"/>
-              <a:t>Es gibt nur noch 6 Übereinstimmungen in den 30 häufigsten Wörtern</a:t>
-            </a:r>
-            <a:r>
-              <a:rPr lang="de-DE" dirty="0" smtClean="0"/>
-              <a:t>.</a:t>
-            </a:r>
-            <a:endParaRPr lang="de-DE" dirty="0" smtClean="0"/>
+              <a:t>Es gibt nur noch 6 Übereinstimmungen in den 30 häufigsten Wörtern.</a:t>
+            </a:r>
           </a:p>
           <a:p>
             <a:pPr lvl="0"/>
@@ -15967,7 +16083,7 @@
         </p:nvGraphicFramePr>
         <p:xfrm>
           <a:off x="5972400" y="1504800"/>
-          <a:ext cx="2998176" cy="4573883"/>
+          <a:ext cx="2998176" cy="4579339"/>
         </p:xfrm>
         <a:graphic>
           <a:graphicData uri="http://schemas.openxmlformats.org/drawingml/2006/table">
@@ -17993,11 +18109,7 @@
             </a:r>
             <a:r>
               <a:rPr lang="de-DE" dirty="0" smtClean="0"/>
-              <a:t> – Ferenc </a:t>
-            </a:r>
-            <a:r>
-              <a:rPr lang="de-DE" dirty="0" smtClean="0"/>
-              <a:t>Molnar</a:t>
+              <a:t> – Ferenc Molnar</a:t>
             </a:r>
           </a:p>
         </p:txBody>
@@ -18265,7 +18377,6 @@
               <a:rPr lang="de-DE" dirty="0"/>
               <a:t>7</a:t>
             </a:r>
-            <a:endParaRPr lang="de-DE" dirty="0"/>
           </a:p>
         </p:txBody>
       </p:sp>
@@ -18330,11 +18441,7 @@
           <a:p>
             <a:r>
               <a:rPr lang="de-DE" sz="2400" b="1" dirty="0" smtClean="0"/>
-              <a:t>Aufgabe 3 – </a:t>
-            </a:r>
-            <a:r>
-              <a:rPr lang="de-DE" sz="2400" b="1" dirty="0" smtClean="0"/>
-              <a:t>Anmerkungen</a:t>
+              <a:t>Aufgabe 3 – Anmerkungen</a:t>
             </a:r>
             <a:endParaRPr lang="de-DE" dirty="0"/>
           </a:p>
@@ -18379,28 +18486,16 @@
               <a:t>haben die Untersuchungen jedoch für beide Fälle analog vorgenommen. Die Ergebnisse ohne Stopp-Wörter finden sich im Verzeichnis: </a:t>
             </a:r>
             <a:r>
-              <a:rPr lang="de-DE" sz="1600" dirty="0">
+              <a:rPr lang="de-DE" sz="1600" dirty="0" smtClean="0">
                 <a:hlinkClick r:id="rId4" action="ppaction://hlinkfile"/>
               </a:rPr>
               <a:t>../</a:t>
             </a:r>
             <a:r>
-              <a:rPr lang="de-DE" sz="1600" dirty="0" err="1">
+              <a:rPr lang="de-DE" sz="1600" dirty="0" err="1" smtClean="0">
                 <a:hlinkClick r:id="rId4" action="ppaction://hlinkfile"/>
               </a:rPr>
-              <a:t>results</a:t>
-            </a:r>
-            <a:r>
-              <a:rPr lang="de-DE" sz="1600" dirty="0">
-                <a:hlinkClick r:id="rId4" action="ppaction://hlinkfile"/>
-              </a:rPr>
-              <a:t>/</a:t>
-            </a:r>
-            <a:r>
-              <a:rPr lang="de-DE" sz="1600" dirty="0" err="1">
-                <a:hlinkClick r:id="rId4" action="ppaction://hlinkfile"/>
-              </a:rPr>
-              <a:t>word</a:t>
+              <a:t>attachment</a:t>
             </a:r>
             <a:r>
               <a:rPr lang="de-DE" sz="1600" dirty="0" smtClean="0">
@@ -18409,8 +18504,36 @@
               <a:t>/</a:t>
             </a:r>
             <a:r>
+              <a:rPr lang="de-DE" sz="1600" dirty="0" err="1" smtClean="0">
+                <a:hlinkClick r:id="rId4" action="ppaction://hlinkfile"/>
+              </a:rPr>
+              <a:t>results</a:t>
+            </a:r>
+            <a:r>
+              <a:rPr lang="de-DE" sz="1600" dirty="0" smtClean="0">
+                <a:hlinkClick r:id="rId4" action="ppaction://hlinkfile"/>
+              </a:rPr>
+              <a:t>/</a:t>
+            </a:r>
+            <a:r>
+              <a:rPr lang="de-DE" sz="1600" dirty="0" err="1" smtClean="0">
+                <a:hlinkClick r:id="rId4" action="ppaction://hlinkfile"/>
+              </a:rPr>
+              <a:t>word</a:t>
+            </a:r>
+            <a:r>
+              <a:rPr lang="de-DE" sz="1600" dirty="0" smtClean="0">
+                <a:hlinkClick r:id="rId4" action="ppaction://hlinkfile"/>
+              </a:rPr>
+              <a:t>/</a:t>
+            </a:r>
+            <a:r>
               <a:rPr lang="de-DE" sz="1600" dirty="0" smtClean="0"/>
-              <a:t> (analoge Dateinamen)</a:t>
+              <a:t> </a:t>
+            </a:r>
+            <a:r>
+              <a:rPr lang="de-DE" sz="1600" dirty="0" smtClean="0"/>
+              <a:t>(analoge Dateinamen)</a:t>
             </a:r>
           </a:p>
           <a:p>
@@ -18430,10 +18553,22 @@
               <a:t>Da in der Aufgabe nicht genau angegeben, wurde die Analyse im Folgenden auf die 30 häufigsten Wörter beschränkt. Analoge Ergebnisse, die alle Wörter miteinbeziehen, finden sich im Verzeichnis: </a:t>
             </a:r>
             <a:r>
-              <a:rPr lang="de-DE" sz="1600" dirty="0">
+              <a:rPr lang="de-DE" sz="1600" dirty="0" smtClean="0">
                 <a:hlinkClick r:id="rId5" action="ppaction://hlinkfile"/>
               </a:rPr>
               <a:t>../</a:t>
+            </a:r>
+            <a:r>
+              <a:rPr lang="de-DE" sz="1600" dirty="0" err="1" smtClean="0">
+                <a:hlinkClick r:id="rId5" action="ppaction://hlinkfile"/>
+              </a:rPr>
+              <a:t>attachment</a:t>
+            </a:r>
+            <a:r>
+              <a:rPr lang="de-DE" sz="1600" dirty="0" smtClean="0">
+                <a:hlinkClick r:id="rId5" action="ppaction://hlinkfile"/>
+              </a:rPr>
+              <a:t>/</a:t>
             </a:r>
             <a:r>
               <a:rPr lang="de-DE" sz="1600" dirty="0" err="1" smtClean="0">
@@ -18506,9 +18641,10 @@
               <a:t>plot_occ</a:t>
             </a:r>
             <a:r>
-              <a:rPr lang="de-DE" sz="1600" dirty="0" smtClean="0"/>
-              <a:t>“. </a:t>
-            </a:r>
+              <a:rPr lang="de-DE" sz="1600" smtClean="0"/>
+              <a:t>“.</a:t>
+            </a:r>
+            <a:endParaRPr lang="de-DE" sz="1600" dirty="0" smtClean="0"/>
           </a:p>
           <a:p>
             <a:pPr marL="342900" indent="-342900">
@@ -18981,8 +19117,8 @@
         </p:nvSpPr>
         <p:spPr>
           <a:xfrm>
-            <a:off x="2237830" y="4320000"/>
-            <a:ext cx="4668340" cy="276999"/>
+            <a:off x="1483796" y="4320000"/>
+            <a:ext cx="6176408" cy="276999"/>
           </a:xfrm>
           <a:prstGeom prst="rect">
             <a:avLst/>
@@ -19009,6 +19145,18 @@
                 <a:hlinkClick r:id="rId5" action="ppaction://hlinkfile"/>
               </a:rPr>
               <a:t>../</a:t>
+            </a:r>
+            <a:r>
+              <a:rPr lang="de-DE" sz="1200" dirty="0" err="1" smtClean="0">
+                <a:hlinkClick r:id="rId5" action="ppaction://hlinkfile"/>
+              </a:rPr>
+              <a:t>attachment</a:t>
+            </a:r>
+            <a:r>
+              <a:rPr lang="de-DE" sz="1200" dirty="0" smtClean="0">
+                <a:hlinkClick r:id="rId5" action="ppaction://hlinkfile"/>
+              </a:rPr>
+              <a:t>/</a:t>
             </a:r>
             <a:r>
               <a:rPr lang="de-DE" sz="1200" dirty="0" err="1" smtClean="0">
@@ -19325,7 +19473,7 @@
   <a:extraClrSchemeLst/>
   <a:extLst>
     <a:ext uri="{05A4C25C-085E-4340-85A3-A5531E510DB2}">
-      <thm15:themeFamily xmlns="" xmlns:thm15="http://schemas.microsoft.com/office/thememl/2012/main" name="Office Theme" id="{62F939B6-93AF-4DB8-9C6B-D6C7DFDC589F}" vid="{4A3C46E8-61CC-4603-A589-7422A47A8E4A}"/>
+      <thm15:themeFamily xmlns:thm15="http://schemas.microsoft.com/office/thememl/2012/main" xmlns="" name="Office Theme" id="{62F939B6-93AF-4DB8-9C6B-D6C7DFDC589F}" vid="{4A3C46E8-61CC-4603-A589-7422A47A8E4A}"/>
     </a:ext>
   </a:extLst>
 </a:theme>
@@ -19586,7 +19734,7 @@
   <a:extraClrSchemeLst/>
   <a:extLst>
     <a:ext uri="{05A4C25C-085E-4340-85A3-A5531E510DB2}">
-      <thm15:themeFamily xmlns="" xmlns:thm15="http://schemas.microsoft.com/office/thememl/2012/main" name="Office Theme" id="{62F939B6-93AF-4DB8-9C6B-D6C7DFDC589F}" vid="{4A3C46E8-61CC-4603-A589-7422A47A8E4A}"/>
+      <thm15:themeFamily xmlns:thm15="http://schemas.microsoft.com/office/thememl/2012/main" xmlns="" name="Office Theme" id="{62F939B6-93AF-4DB8-9C6B-D6C7DFDC589F}" vid="{4A3C46E8-61CC-4603-A589-7422A47A8E4A}"/>
     </a:ext>
   </a:extLst>
 </a:theme>

</xml_diff>